<commit_message>
Fix whitespace issue in GameManagerClassDiagram
</commit_message>
<xml_diff>
--- a/docs/diagrams/GameManagerClassDiagram.pptx
+++ b/docs/diagrams/GameManagerClassDiagram.pptx
@@ -3450,8 +3450,8 @@
         </p:nvSpPr>
         <p:spPr>
           <a:xfrm>
-            <a:off x="1636098" y="4611190"/>
-            <a:ext cx="6303221" cy="1513215"/>
+            <a:off x="1148308" y="4611190"/>
+            <a:ext cx="6791012" cy="1513215"/>
           </a:xfrm>
           <a:prstGeom prst="roundRect">
             <a:avLst>

</xml_diff>